<commit_message>
Added dashboard pictures in Readme
</commit_message>
<xml_diff>
--- a/Output/DBC Bootcamp Hackathon Presentation - Chocolate Sales Analysis.pptx
+++ b/Output/DBC Bootcamp Hackathon Presentation - Chocolate Sales Analysis.pptx
@@ -5,7 +5,7 @@
     <p:sldMasterId id="2147483648" r:id="rId1"/>
   </p:sldMasterIdLst>
   <p:notesMasterIdLst>
-    <p:notesMasterId r:id="rId26"/>
+    <p:notesMasterId r:id="rId25"/>
   </p:notesMasterIdLst>
   <p:sldIdLst>
     <p:sldId id="256" r:id="rId2"/>
@@ -27,11 +27,10 @@
     <p:sldId id="284" r:id="rId18"/>
     <p:sldId id="285" r:id="rId19"/>
     <p:sldId id="287" r:id="rId20"/>
-    <p:sldId id="286" r:id="rId21"/>
-    <p:sldId id="274" r:id="rId22"/>
-    <p:sldId id="282" r:id="rId23"/>
-    <p:sldId id="275" r:id="rId24"/>
-    <p:sldId id="276" r:id="rId25"/>
+    <p:sldId id="274" r:id="rId21"/>
+    <p:sldId id="282" r:id="rId22"/>
+    <p:sldId id="275" r:id="rId23"/>
+    <p:sldId id="276" r:id="rId24"/>
   </p:sldIdLst>
   <p:sldSz cx="9144000" cy="5143500" type="screen16x9"/>
   <p:notesSz cx="9144000" cy="5143500"/>
@@ -641,7 +640,7 @@
           <a:p>
             <a:fld id="{590577F1-8645-46F3-A0ED-7CA5ABCBB796}" type="slidenum">
               <a:rPr lang="en-GB" smtClean="0"/>
-              <a:t>21</a:t>
+              <a:t>20</a:t>
             </a:fld>
             <a:endParaRPr lang="en-GB"/>
           </a:p>
@@ -749,7 +748,7 @@
           <a:p>
             <a:fld id="{590577F1-8645-46F3-A0ED-7CA5ABCBB796}" type="slidenum">
               <a:rPr lang="en-GB" smtClean="0"/>
-              <a:t>22</a:t>
+              <a:t>21</a:t>
             </a:fld>
             <a:endParaRPr lang="en-GB"/>
           </a:p>
@@ -9312,86 +9311,6 @@
 </file>
 
 <file path=ppt/slides/slide20.xml><?xml version="1.0" encoding="utf-8"?>
-<p:sld xmlns:a="http://schemas.openxmlformats.org/drawingml/2006/main" xmlns:r="http://schemas.openxmlformats.org/officeDocument/2006/relationships" xmlns:p="http://schemas.openxmlformats.org/presentationml/2006/main">
-  <p:cSld>
-    <p:bg>
-      <p:bgPr>
-        <a:solidFill>
-          <a:srgbClr val="714737"/>
-        </a:solidFill>
-        <a:effectLst/>
-      </p:bgPr>
-    </p:bg>
-    <p:spTree>
-      <p:nvGrpSpPr>
-        <p:cNvPr id="1" name="">
-          <a:extLst>
-            <a:ext uri="{FF2B5EF4-FFF2-40B4-BE49-F238E27FC236}">
-              <a16:creationId xmlns:a16="http://schemas.microsoft.com/office/drawing/2014/main" id="{FF2CC3FA-564A-6CB7-BD64-41807B8B724D}"/>
-            </a:ext>
-          </a:extLst>
-        </p:cNvPr>
-        <p:cNvGrpSpPr/>
-        <p:nvPr/>
-      </p:nvGrpSpPr>
-      <p:grpSpPr>
-        <a:xfrm>
-          <a:off x="0" y="0"/>
-          <a:ext cx="0" cy="0"/>
-          <a:chOff x="0" y="0"/>
-          <a:chExt cx="0" cy="0"/>
-        </a:xfrm>
-      </p:grpSpPr>
-      <p:pic>
-        <p:nvPicPr>
-          <p:cNvPr id="3" name="Picture 2" descr="A screenshot of a computer screen&#10;&#10;AI-generated content may be incorrect.">
-            <a:extLst>
-              <a:ext uri="{FF2B5EF4-FFF2-40B4-BE49-F238E27FC236}">
-                <a16:creationId xmlns:a16="http://schemas.microsoft.com/office/drawing/2014/main" id="{27169F12-1F6B-82AE-F9A1-72DA0265DAB7}"/>
-              </a:ext>
-            </a:extLst>
-          </p:cNvPr>
-          <p:cNvPicPr>
-            <a:picLocks noChangeAspect="1"/>
-          </p:cNvPicPr>
-          <p:nvPr/>
-        </p:nvPicPr>
-        <p:blipFill>
-          <a:blip r:embed="rId2">
-            <a:extLst>
-              <a:ext uri="{28A0092B-C50C-407E-A947-70E740481C1C}">
-                <a14:useLocalDpi xmlns:a14="http://schemas.microsoft.com/office/drawing/2010/main" val="0"/>
-              </a:ext>
-            </a:extLst>
-          </a:blip>
-          <a:stretch>
-            <a:fillRect/>
-          </a:stretch>
-        </p:blipFill>
-        <p:spPr>
-          <a:xfrm>
-            <a:off x="304800" y="890867"/>
-            <a:ext cx="8534400" cy="3361765"/>
-          </a:xfrm>
-          <a:prstGeom prst="rect">
-            <a:avLst/>
-          </a:prstGeom>
-        </p:spPr>
-      </p:pic>
-    </p:spTree>
-    <p:extLst>
-      <p:ext uri="{BB962C8B-B14F-4D97-AF65-F5344CB8AC3E}">
-        <p14:creationId xmlns:p14="http://schemas.microsoft.com/office/powerpoint/2010/main" val="120994724"/>
-      </p:ext>
-    </p:extLst>
-  </p:cSld>
-  <p:clrMapOvr>
-    <a:masterClrMapping/>
-  </p:clrMapOvr>
-</p:sld>
-</file>
-
-<file path=ppt/slides/slide21.xml><?xml version="1.0" encoding="utf-8"?>
 <p:sld xmlns:a="http://schemas.openxmlformats.org/drawingml/2006/main" xmlns:r="http://schemas.openxmlformats.org/officeDocument/2006/relationships" xmlns:p="http://schemas.openxmlformats.org/presentationml/2006/main" showMasterSp="0">
   <p:cSld>
     <p:bg>
@@ -10230,7 +10149,7 @@
 </p:sld>
 </file>
 
-<file path=ppt/slides/slide22.xml><?xml version="1.0" encoding="utf-8"?>
+<file path=ppt/slides/slide21.xml><?xml version="1.0" encoding="utf-8"?>
 <p:sld xmlns:a="http://schemas.openxmlformats.org/drawingml/2006/main" xmlns:r="http://schemas.openxmlformats.org/officeDocument/2006/relationships" xmlns:p="http://schemas.openxmlformats.org/presentationml/2006/main" showMasterSp="0">
   <p:cSld>
     <p:bg>
@@ -10648,7 +10567,7 @@
 </p:sld>
 </file>
 
-<file path=ppt/slides/slide23.xml><?xml version="1.0" encoding="utf-8"?>
+<file path=ppt/slides/slide22.xml><?xml version="1.0" encoding="utf-8"?>
 <p:sld xmlns:a="http://schemas.openxmlformats.org/drawingml/2006/main" xmlns:r="http://schemas.openxmlformats.org/officeDocument/2006/relationships" xmlns:p="http://schemas.openxmlformats.org/presentationml/2006/main" showMasterSp="0">
   <p:cSld>
     <p:bg>
@@ -13210,7 +13129,7 @@
 </p:sld>
 </file>
 
-<file path=ppt/slides/slide24.xml><?xml version="1.0" encoding="utf-8"?>
+<file path=ppt/slides/slide23.xml><?xml version="1.0" encoding="utf-8"?>
 <p:sld xmlns:a="http://schemas.openxmlformats.org/drawingml/2006/main" xmlns:r="http://schemas.openxmlformats.org/officeDocument/2006/relationships" xmlns:p="http://schemas.openxmlformats.org/presentationml/2006/main" showMasterSp="0">
   <p:cSld>
     <p:bg>

</xml_diff>